<commit_message>
updated schem and erd and final presentation with its pdf
</commit_message>
<xml_diff>
--- a/Report/Final_presentation.pptx
+++ b/Report/Final_presentation.pptx
@@ -6422,10 +6422,10 @@
       </p:grpSpPr>
       <p:pic>
         <p:nvPicPr>
-          <p:cNvPr id="9" name="Content Placeholder 8">
+          <p:cNvPr id="5" name="Content Placeholder 4">
             <a:extLst>
               <a:ext uri="{FF2B5EF4-FFF2-40B4-BE49-F238E27FC236}">
-                <a16:creationId xmlns:a16="http://schemas.microsoft.com/office/drawing/2014/main" id="{055667F2-73F6-130A-8152-E05A9583A44D}"/>
+                <a16:creationId xmlns:a16="http://schemas.microsoft.com/office/drawing/2014/main" id="{70B0B348-8F6D-FED7-BADA-FCA8ABF9AA29}"/>
               </a:ext>
             </a:extLst>
           </p:cNvPr>
@@ -6444,8 +6444,8 @@
         </p:blipFill>
         <p:spPr>
           <a:xfrm>
-            <a:off x="0" y="755869"/>
-            <a:ext cx="12192000" cy="5346261"/>
+            <a:off x="0" y="732757"/>
+            <a:ext cx="12192000" cy="5392485"/>
           </a:xfrm>
         </p:spPr>
       </p:pic>
@@ -6481,10 +6481,10 @@
       </p:grpSpPr>
       <p:pic>
         <p:nvPicPr>
-          <p:cNvPr id="9" name="Content Placeholder 8">
+          <p:cNvPr id="5" name="Content Placeholder 4">
             <a:extLst>
               <a:ext uri="{FF2B5EF4-FFF2-40B4-BE49-F238E27FC236}">
-                <a16:creationId xmlns:a16="http://schemas.microsoft.com/office/drawing/2014/main" id="{3EB2EA46-2141-2003-5506-B1CE9015DD50}"/>
+                <a16:creationId xmlns:a16="http://schemas.microsoft.com/office/drawing/2014/main" id="{D666D28B-3615-E2A9-7CC8-F881E6207C48}"/>
               </a:ext>
             </a:extLst>
           </p:cNvPr>
@@ -6503,8 +6503,8 @@
         </p:blipFill>
         <p:spPr>
           <a:xfrm>
-            <a:off x="0" y="666012"/>
-            <a:ext cx="12192000" cy="5525975"/>
+            <a:off x="0" y="685438"/>
+            <a:ext cx="12192000" cy="5487124"/>
           </a:xfrm>
         </p:spPr>
       </p:pic>

</xml_diff>